<commit_message>
update hibernate example and ppt.
</commit_message>
<xml_diff>
--- a/sa/文档/2019 软件体系结构（08）：ORM DAO模式.pptx
+++ b/sa/文档/2019 软件体系结构（08）：ORM DAO模式.pptx
@@ -5,22 +5,25 @@
     <p:sldMasterId id="2147483648" r:id="rId1"/>
   </p:sldMasterIdLst>
   <p:notesMasterIdLst>
-    <p:notesMasterId r:id="rId8"/>
+    <p:notesMasterId r:id="rId10"/>
   </p:notesMasterIdLst>
   <p:sldIdLst>
     <p:sldId id="256" r:id="rId3"/>
     <p:sldId id="261" r:id="rId4"/>
     <p:sldId id="257" r:id="rId5"/>
     <p:sldId id="260" r:id="rId6"/>
-    <p:sldId id="258" r:id="rId7"/>
-    <p:sldId id="266" r:id="rId9"/>
-    <p:sldId id="267" r:id="rId10"/>
-    <p:sldId id="259" r:id="rId11"/>
+    <p:sldId id="269" r:id="rId7"/>
+    <p:sldId id="271" r:id="rId8"/>
+    <p:sldId id="258" r:id="rId9"/>
+    <p:sldId id="266" r:id="rId11"/>
+    <p:sldId id="273" r:id="rId12"/>
+    <p:sldId id="267" r:id="rId13"/>
+    <p:sldId id="259" r:id="rId14"/>
   </p:sldIdLst>
   <p:sldSz cx="12192000" cy="6858000"/>
   <p:notesSz cx="7103745" cy="10234295"/>
   <p:custDataLst>
-    <p:tags r:id="rId15"/>
+    <p:tags r:id="rId18"/>
   </p:custDataLst>
   <p:defaultTextStyle>
     <a:defPPr>
@@ -3080,6 +3083,324 @@
 </p:sld>
 </file>
 
+<file path=ppt/slides/slide10.xml><?xml version="1.0" encoding="utf-8"?>
+<p:sld xmlns:a="http://schemas.openxmlformats.org/drawingml/2006/main" xmlns:r="http://schemas.openxmlformats.org/officeDocument/2006/relationships" xmlns:p="http://schemas.openxmlformats.org/presentationml/2006/main">
+  <p:cSld>
+    <p:spTree>
+      <p:nvGrpSpPr>
+        <p:cNvPr id="1" name=""/>
+        <p:cNvGrpSpPr/>
+        <p:nvPr/>
+      </p:nvGrpSpPr>
+      <p:grpSpPr/>
+      <p:sp>
+        <p:nvSpPr>
+          <p:cNvPr id="2" name="标题 1"/>
+          <p:cNvSpPr>
+            <a:spLocks noGrp="1"/>
+          </p:cNvSpPr>
+          <p:nvPr>
+            <p:ph type="title"/>
+          </p:nvPr>
+        </p:nvSpPr>
+        <p:spPr/>
+        <p:txBody>
+          <a:bodyPr/>
+          <a:p>
+            <a:r>
+              <a:rPr lang="zh-CN" altLang="en-US"/>
+              <a:t>利用实体对象、</a:t>
+            </a:r>
+            <a:r>
+              <a:rPr lang="en-US" altLang="zh-CN"/>
+              <a:t>DAO</a:t>
+            </a:r>
+            <a:r>
+              <a:rPr lang="zh-CN" altLang="en-US"/>
+              <a:t>对象操作数据</a:t>
+            </a:r>
+            <a:endParaRPr lang="zh-CN" altLang="en-US"/>
+          </a:p>
+        </p:txBody>
+      </p:sp>
+      <p:sp>
+        <p:nvSpPr>
+          <p:cNvPr id="3" name="内容占位符 2"/>
+          <p:cNvSpPr>
+            <a:spLocks noGrp="1"/>
+          </p:cNvSpPr>
+          <p:nvPr>
+            <p:ph idx="1"/>
+          </p:nvPr>
+        </p:nvSpPr>
+        <p:spPr>
+          <a:xfrm>
+            <a:off x="838200" y="1825625"/>
+            <a:ext cx="4333875" cy="4351655"/>
+          </a:xfrm>
+        </p:spPr>
+        <p:txBody>
+          <a:bodyPr/>
+          <a:p>
+            <a:r>
+              <a:rPr lang="zh-CN" altLang="en-US"/>
+              <a:t>以</a:t>
+            </a:r>
+            <a:r>
+              <a:rPr lang="en-US" altLang="zh-CN"/>
+              <a:t>Student</a:t>
+            </a:r>
+            <a:r>
+              <a:rPr lang="zh-CN" altLang="en-US"/>
+              <a:t>对象为例</a:t>
+            </a:r>
+            <a:endParaRPr lang="zh-CN" altLang="en-US"/>
+          </a:p>
+          <a:p>
+            <a:r>
+              <a:rPr lang="en-US" altLang="zh-CN"/>
+              <a:t>Public class StudentDAO{</a:t>
+            </a:r>
+            <a:endParaRPr lang="en-US" altLang="zh-CN"/>
+          </a:p>
+          <a:p>
+            <a:pPr lvl="1"/>
+            <a:r>
+              <a:rPr lang="en-US" altLang="zh-CN"/>
+              <a:t>Student findBy(???)</a:t>
+            </a:r>
+            <a:endParaRPr lang="en-US" altLang="zh-CN"/>
+          </a:p>
+          <a:p>
+            <a:pPr lvl="1"/>
+            <a:r>
+              <a:rPr lang="en-US" altLang="zh-CN"/>
+              <a:t>List </a:t>
+            </a:r>
+            <a:r>
+              <a:rPr lang="en-US" altLang="zh-CN">
+                <a:sym typeface="+mn-ea"/>
+              </a:rPr>
+              <a:t>Student findBy(???)</a:t>
+            </a:r>
+            <a:endParaRPr lang="en-US" altLang="zh-CN">
+              <a:sym typeface="+mn-ea"/>
+            </a:endParaRPr>
+          </a:p>
+          <a:p>
+            <a:pPr lvl="1"/>
+            <a:r>
+              <a:rPr lang="en-US" altLang="zh-CN">
+                <a:sym typeface="+mn-ea"/>
+              </a:rPr>
+              <a:t>add </a:t>
+            </a:r>
+            <a:r>
+              <a:rPr lang="zh-CN" altLang="en-US">
+                <a:sym typeface="+mn-ea"/>
+              </a:rPr>
+              <a:t>（</a:t>
+            </a:r>
+            <a:r>
+              <a:rPr lang="en-US" altLang="zh-CN">
+                <a:sym typeface="+mn-ea"/>
+              </a:rPr>
+              <a:t>???</a:t>
+            </a:r>
+            <a:r>
+              <a:rPr lang="zh-CN" altLang="en-US">
+                <a:sym typeface="+mn-ea"/>
+              </a:rPr>
+              <a:t>）</a:t>
+            </a:r>
+            <a:endParaRPr lang="zh-CN" altLang="en-US">
+              <a:sym typeface="+mn-ea"/>
+            </a:endParaRPr>
+          </a:p>
+          <a:p>
+            <a:pPr lvl="1"/>
+            <a:r>
+              <a:rPr lang="en-US" altLang="zh-CN">
+                <a:sym typeface="+mn-ea"/>
+              </a:rPr>
+              <a:t>modify(???)</a:t>
+            </a:r>
+            <a:endParaRPr lang="en-US" altLang="zh-CN">
+              <a:sym typeface="+mn-ea"/>
+            </a:endParaRPr>
+          </a:p>
+          <a:p>
+            <a:pPr lvl="1"/>
+            <a:r>
+              <a:rPr lang="en-US" altLang="zh-CN">
+                <a:sym typeface="+mn-ea"/>
+              </a:rPr>
+              <a:t>delete(???)</a:t>
+            </a:r>
+            <a:endParaRPr lang="en-US" altLang="zh-CN">
+              <a:sym typeface="+mn-ea"/>
+            </a:endParaRPr>
+          </a:p>
+          <a:p>
+            <a:pPr lvl="1"/>
+            <a:endParaRPr lang="en-US" altLang="zh-CN">
+              <a:sym typeface="+mn-ea"/>
+            </a:endParaRPr>
+          </a:p>
+          <a:p>
+            <a:pPr lvl="1"/>
+            <a:endParaRPr lang="en-US" altLang="zh-CN"/>
+          </a:p>
+          <a:p>
+            <a:r>
+              <a:rPr lang="en-US" altLang="zh-CN"/>
+              <a:t>}</a:t>
+            </a:r>
+            <a:endParaRPr lang="en-US" altLang="zh-CN"/>
+          </a:p>
+        </p:txBody>
+      </p:sp>
+      <p:sp>
+        <p:nvSpPr>
+          <p:cNvPr id="4" name="文本框 3"/>
+          <p:cNvSpPr txBox="1"/>
+          <p:nvPr/>
+        </p:nvSpPr>
+        <p:spPr>
+          <a:xfrm>
+            <a:off x="6841490" y="1941830"/>
+            <a:ext cx="3622675" cy="1014730"/>
+          </a:xfrm>
+          <a:prstGeom prst="rect">
+            <a:avLst/>
+          </a:prstGeom>
+          <a:noFill/>
+        </p:spPr>
+        <p:txBody>
+          <a:bodyPr wrap="square" rtlCol="0">
+            <a:spAutoFit/>
+          </a:bodyPr>
+          <a:p>
+            <a:r>
+              <a:rPr lang="zh-CN" altLang="en-US" sz="2000"/>
+              <a:t>抽取公共的操纵数据库的方法</a:t>
+            </a:r>
+            <a:endParaRPr lang="zh-CN" altLang="en-US" sz="2000"/>
+          </a:p>
+          <a:p>
+            <a:r>
+              <a:rPr lang="zh-CN" altLang="en-US" sz="2000"/>
+              <a:t>抽取对象封装位查询语句的方法</a:t>
+            </a:r>
+            <a:endParaRPr lang="zh-CN" altLang="en-US" sz="2000"/>
+          </a:p>
+        </p:txBody>
+      </p:sp>
+    </p:spTree>
+  </p:cSld>
+  <p:clrMapOvr>
+    <a:masterClrMapping/>
+  </p:clrMapOvr>
+</p:sld>
+</file>
+
+<file path=ppt/slides/slide11.xml><?xml version="1.0" encoding="utf-8"?>
+<p:sld xmlns:a="http://schemas.openxmlformats.org/drawingml/2006/main" xmlns:r="http://schemas.openxmlformats.org/officeDocument/2006/relationships" xmlns:p="http://schemas.openxmlformats.org/presentationml/2006/main">
+  <p:cSld>
+    <p:spTree>
+      <p:nvGrpSpPr>
+        <p:cNvPr id="1" name=""/>
+        <p:cNvGrpSpPr/>
+        <p:nvPr/>
+      </p:nvGrpSpPr>
+      <p:grpSpPr/>
+      <p:sp>
+        <p:nvSpPr>
+          <p:cNvPr id="2" name="标题 1"/>
+          <p:cNvSpPr>
+            <a:spLocks noGrp="1"/>
+          </p:cNvSpPr>
+          <p:nvPr>
+            <p:ph type="title"/>
+          </p:nvPr>
+        </p:nvSpPr>
+        <p:spPr/>
+        <p:txBody>
+          <a:bodyPr/>
+          <a:p>
+            <a:r>
+              <a:rPr lang="en-US" altLang="zh-CN"/>
+              <a:t>Hibernate</a:t>
+            </a:r>
+            <a:r>
+              <a:rPr lang="zh-CN" altLang="en-US"/>
+              <a:t>框架</a:t>
+            </a:r>
+            <a:endParaRPr lang="zh-CN" altLang="en-US"/>
+          </a:p>
+        </p:txBody>
+      </p:sp>
+      <p:sp>
+        <p:nvSpPr>
+          <p:cNvPr id="3" name="内容占位符 2"/>
+          <p:cNvSpPr>
+            <a:spLocks noGrp="1"/>
+          </p:cNvSpPr>
+          <p:nvPr>
+            <p:ph idx="1"/>
+          </p:nvPr>
+        </p:nvSpPr>
+        <p:spPr/>
+        <p:txBody>
+          <a:bodyPr/>
+          <a:p>
+            <a:r>
+              <a:rPr lang="zh-CN" altLang="en-US"/>
+              <a:t>结合</a:t>
+            </a:r>
+            <a:r>
+              <a:rPr lang="en-US" altLang="zh-CN"/>
+              <a:t>MyEclipse4Spring</a:t>
+            </a:r>
+            <a:r>
+              <a:rPr lang="zh-CN" altLang="en-US"/>
+              <a:t>讲解</a:t>
+            </a:r>
+            <a:endParaRPr lang="zh-CN" altLang="en-US"/>
+          </a:p>
+          <a:p>
+            <a:r>
+              <a:rPr lang="zh-CN" altLang="en-US"/>
+              <a:t>框架：</a:t>
+            </a:r>
+            <a:endParaRPr lang="zh-CN" altLang="en-US"/>
+          </a:p>
+          <a:p>
+            <a:pPr lvl="1"/>
+            <a:r>
+              <a:rPr lang="zh-CN" altLang="en-US"/>
+              <a:t>复用</a:t>
+            </a:r>
+            <a:endParaRPr lang="zh-CN" altLang="en-US"/>
+          </a:p>
+          <a:p>
+            <a:pPr lvl="1"/>
+            <a:r>
+              <a:rPr lang="zh-CN" altLang="en-US"/>
+              <a:t>设计很好，并有代码实现</a:t>
+            </a:r>
+            <a:endParaRPr lang="zh-CN" altLang="en-US"/>
+          </a:p>
+        </p:txBody>
+      </p:sp>
+    </p:spTree>
+  </p:cSld>
+  <p:clrMapOvr>
+    <a:masterClrMapping/>
+  </p:clrMapOvr>
+</p:sld>
+</file>
+
 <file path=ppt/slides/slide2.xml><?xml version="1.0" encoding="utf-8"?>
 <p:sld xmlns:a="http://schemas.openxmlformats.org/drawingml/2006/main" xmlns:r="http://schemas.openxmlformats.org/officeDocument/2006/relationships" xmlns:p="http://schemas.openxmlformats.org/presentationml/2006/main">
   <p:cSld>
@@ -3539,10 +3860,10 @@
           <a:bodyPr/>
           <a:p>
             <a:r>
-              <a:rPr lang="en-US" altLang="zh-CN"/>
-              <a:t>DAO</a:t>
-            </a:r>
-            <a:endParaRPr lang="en-US" altLang="zh-CN"/>
+              <a:rPr lang="zh-CN" altLang="en-US"/>
+              <a:t>DatabaseJdbcClient</a:t>
+            </a:r>
+            <a:endParaRPr lang="zh-CN" altLang="en-US"/>
           </a:p>
         </p:txBody>
       </p:sp>
@@ -3556,56 +3877,67 @@
             <p:ph idx="1"/>
           </p:nvPr>
         </p:nvSpPr>
-        <p:spPr/>
-        <p:txBody>
-          <a:bodyPr/>
-          <a:p>
-            <a:r>
-              <a:rPr lang="zh-CN" altLang="en-US"/>
-              <a:t>对数据的增删查改利用专门的对象进行操纵的方式</a:t>
-            </a:r>
-            <a:endParaRPr lang="zh-CN" altLang="en-US"/>
-          </a:p>
-          <a:p>
-            <a:endParaRPr lang="zh-CN" altLang="en-US"/>
-          </a:p>
-          <a:p>
-            <a:r>
-              <a:rPr lang="zh-CN" altLang="en-US"/>
-              <a:t>加载驱动</a:t>
-            </a:r>
-            <a:endParaRPr lang="zh-CN" altLang="en-US"/>
-          </a:p>
-          <a:p>
-            <a:r>
-              <a:rPr lang="en-US" altLang="zh-CN"/>
-              <a:t>classforname(“com.mysql.jdbc.connector”)</a:t>
-            </a:r>
-            <a:endParaRPr lang="en-US" altLang="zh-CN"/>
-          </a:p>
-          <a:p>
-            <a:r>
-              <a:rPr lang="en-US" altLang="zh-CN"/>
-              <a:t>dr</a:t>
-            </a:r>
-            <a:endParaRPr lang="en-US" altLang="zh-CN"/>
-          </a:p>
-          <a:p>
-            <a:r>
-              <a:rPr lang="en-US" altLang="zh-CN"/>
-              <a:t>name</a:t>
-            </a:r>
-            <a:endParaRPr lang="en-US" altLang="zh-CN"/>
-          </a:p>
-          <a:p>
-            <a:r>
-              <a:rPr lang="en-US" altLang="zh-CN"/>
-              <a:t>...</a:t>
-            </a:r>
-            <a:endParaRPr lang="en-US" altLang="zh-CN"/>
-          </a:p>
-          <a:p>
-            <a:endParaRPr lang="zh-CN" altLang="en-US"/>
+        <p:spPr>
+          <a:xfrm>
+            <a:off x="1035050" y="1974850"/>
+            <a:ext cx="7245350" cy="4689475"/>
+          </a:xfrm>
+        </p:spPr>
+        <p:txBody>
+          <a:bodyPr/>
+          <a:p>
+            <a:r>
+              <a:rPr lang="zh-CN" altLang="en-US" sz="4400"/>
+              <a:t>main(String[] args) {</a:t>
+            </a:r>
+            <a:endParaRPr lang="zh-CN" altLang="en-US" sz="4400"/>
+          </a:p>
+          <a:p>
+            <a:pPr lvl="1"/>
+            <a:r>
+              <a:rPr lang="zh-CN" altLang="en-US" sz="4000"/>
+              <a:t>Book book=new Book();</a:t>
+            </a:r>
+            <a:endParaRPr lang="zh-CN" altLang="en-US" sz="4000"/>
+          </a:p>
+          <a:p>
+            <a:pPr lvl="1"/>
+            <a:r>
+              <a:rPr lang="zh-CN" altLang="en-US" sz="4000"/>
+              <a:t>book.setName("sa");</a:t>
+            </a:r>
+            <a:endParaRPr lang="zh-CN" altLang="en-US" sz="4000"/>
+          </a:p>
+          <a:p>
+            <a:pPr lvl="1"/>
+            <a:r>
+              <a:rPr lang="zh-CN" altLang="en-US" sz="4000"/>
+              <a:t>book.setId(103L);</a:t>
+            </a:r>
+            <a:endParaRPr lang="zh-CN" altLang="en-US" sz="4000"/>
+          </a:p>
+          <a:p>
+            <a:pPr lvl="1"/>
+            <a:r>
+              <a:rPr lang="zh-CN" altLang="en-US" sz="4000"/>
+              <a:t>newBook(book);</a:t>
+            </a:r>
+            <a:endParaRPr lang="zh-CN" altLang="en-US" sz="4000"/>
+          </a:p>
+          <a:p>
+            <a:pPr lvl="1"/>
+            <a:r>
+              <a:rPr lang="zh-CN" altLang="en-US" sz="4000"/>
+              <a:t>listAllBooks();</a:t>
+            </a:r>
+            <a:endParaRPr lang="zh-CN" altLang="en-US" sz="4000"/>
+          </a:p>
+          <a:p>
+            <a:r>
+              <a:rPr lang="zh-CN" altLang="en-US" sz="4400"/>
+              <a:t>}</a:t>
+            </a:r>
+            <a:endParaRPr lang="zh-CN" altLang="en-US" sz="4400"/>
           </a:p>
         </p:txBody>
       </p:sp>
@@ -3643,98 +3975,587 @@
           <a:p>
             <a:r>
               <a:rPr lang="zh-CN" altLang="en-US"/>
-              <a:t>利用实体对象、</a:t>
-            </a:r>
-            <a:r>
-              <a:rPr lang="en-US" altLang="zh-CN"/>
-              <a:t>DAO</a:t>
-            </a:r>
-            <a:r>
-              <a:rPr lang="zh-CN" altLang="en-US"/>
-              <a:t>对象操作数据</a:t>
-            </a:r>
-            <a:endParaRPr lang="zh-CN" altLang="en-US"/>
-          </a:p>
-        </p:txBody>
-      </p:sp>
-      <p:sp>
-        <p:nvSpPr>
-          <p:cNvPr id="3" name="内容占位符 2"/>
-          <p:cNvSpPr>
-            <a:spLocks noGrp="1"/>
-          </p:cNvSpPr>
-          <p:nvPr>
-            <p:ph idx="1"/>
-          </p:nvPr>
+              <a:t>DatabaseJdbcClient</a:t>
+            </a:r>
+            <a:endParaRPr lang="zh-CN" altLang="en-US"/>
+          </a:p>
+        </p:txBody>
+      </p:sp>
+      <p:sp>
+        <p:nvSpPr>
+          <p:cNvPr id="4" name="内容占位符 2"/>
+          <p:cNvSpPr>
+            <a:spLocks noGrp="1"/>
+          </p:cNvSpPr>
+          <p:nvPr/>
         </p:nvSpPr>
         <p:spPr>
           <a:xfrm>
-            <a:off x="838200" y="1825625"/>
-            <a:ext cx="6186805" cy="4351655"/>
+            <a:off x="454660" y="1691005"/>
+            <a:ext cx="5800090" cy="4682490"/>
           </a:xfrm>
+          <a:prstGeom prst="rect">
+            <a:avLst/>
+          </a:prstGeom>
         </p:spPr>
         <p:txBody>
-          <a:bodyPr/>
+          <a:bodyPr vert="horz" lIns="91440" tIns="45720" rIns="91440" bIns="45720" rtlCol="0"/>
+          <a:lstStyle>
+            <a:lvl1pPr marL="228600" indent="-228600" algn="l" defTabSz="914400" rtl="0" eaLnBrk="1" latinLnBrk="0" hangingPunct="1">
+              <a:lnSpc>
+                <a:spcPct val="90000"/>
+              </a:lnSpc>
+              <a:spcBef>
+                <a:spcPts val="1000"/>
+              </a:spcBef>
+              <a:buFont typeface="Arial" panose="020B0604020202020204" pitchFamily="34" charset="0"/>
+              <a:buChar char="•"/>
+              <a:defRPr sz="2800" kern="1200">
+                <a:solidFill>
+                  <a:schemeClr val="tx1"/>
+                </a:solidFill>
+                <a:latin typeface="+mn-lt"/>
+                <a:ea typeface="+mn-ea"/>
+                <a:cs typeface="+mn-cs"/>
+              </a:defRPr>
+            </a:lvl1pPr>
+            <a:lvl2pPr marL="685800" indent="-228600" algn="l" defTabSz="914400" rtl="0" eaLnBrk="1" latinLnBrk="0" hangingPunct="1">
+              <a:lnSpc>
+                <a:spcPct val="90000"/>
+              </a:lnSpc>
+              <a:spcBef>
+                <a:spcPts val="500"/>
+              </a:spcBef>
+              <a:buFont typeface="Arial" panose="020B0604020202020204" pitchFamily="34" charset="0"/>
+              <a:buChar char="•"/>
+              <a:defRPr sz="2400" kern="1200">
+                <a:solidFill>
+                  <a:schemeClr val="tx1"/>
+                </a:solidFill>
+                <a:latin typeface="+mn-lt"/>
+                <a:ea typeface="+mn-ea"/>
+                <a:cs typeface="+mn-cs"/>
+              </a:defRPr>
+            </a:lvl2pPr>
+            <a:lvl3pPr marL="1143000" indent="-228600" algn="l" defTabSz="914400" rtl="0" eaLnBrk="1" latinLnBrk="0" hangingPunct="1">
+              <a:lnSpc>
+                <a:spcPct val="90000"/>
+              </a:lnSpc>
+              <a:spcBef>
+                <a:spcPts val="500"/>
+              </a:spcBef>
+              <a:buFont typeface="Arial" panose="020B0604020202020204" pitchFamily="34" charset="0"/>
+              <a:buChar char="•"/>
+              <a:defRPr sz="2000" kern="1200">
+                <a:solidFill>
+                  <a:schemeClr val="tx1"/>
+                </a:solidFill>
+                <a:latin typeface="+mn-lt"/>
+                <a:ea typeface="+mn-ea"/>
+                <a:cs typeface="+mn-cs"/>
+              </a:defRPr>
+            </a:lvl3pPr>
+            <a:lvl4pPr marL="1600200" indent="-228600" algn="l" defTabSz="914400" rtl="0" eaLnBrk="1" latinLnBrk="0" hangingPunct="1">
+              <a:lnSpc>
+                <a:spcPct val="90000"/>
+              </a:lnSpc>
+              <a:spcBef>
+                <a:spcPts val="500"/>
+              </a:spcBef>
+              <a:buFont typeface="Arial" panose="020B0604020202020204" pitchFamily="34" charset="0"/>
+              <a:buChar char="•"/>
+              <a:defRPr sz="1800" kern="1200">
+                <a:solidFill>
+                  <a:schemeClr val="tx1"/>
+                </a:solidFill>
+                <a:latin typeface="+mn-lt"/>
+                <a:ea typeface="+mn-ea"/>
+                <a:cs typeface="+mn-cs"/>
+              </a:defRPr>
+            </a:lvl4pPr>
+            <a:lvl5pPr marL="2057400" indent="-228600" algn="l" defTabSz="914400" rtl="0" eaLnBrk="1" latinLnBrk="0" hangingPunct="1">
+              <a:lnSpc>
+                <a:spcPct val="90000"/>
+              </a:lnSpc>
+              <a:spcBef>
+                <a:spcPts val="500"/>
+              </a:spcBef>
+              <a:buFont typeface="Arial" panose="020B0604020202020204" pitchFamily="34" charset="0"/>
+              <a:buChar char="•"/>
+              <a:defRPr sz="1800" kern="1200">
+                <a:solidFill>
+                  <a:schemeClr val="tx1"/>
+                </a:solidFill>
+                <a:latin typeface="+mn-lt"/>
+                <a:ea typeface="+mn-ea"/>
+                <a:cs typeface="+mn-cs"/>
+              </a:defRPr>
+            </a:lvl5pPr>
+            <a:lvl6pPr marL="2514600" indent="-228600" algn="l" defTabSz="914400" rtl="0" eaLnBrk="1" latinLnBrk="0" hangingPunct="1">
+              <a:lnSpc>
+                <a:spcPct val="90000"/>
+              </a:lnSpc>
+              <a:spcBef>
+                <a:spcPts val="500"/>
+              </a:spcBef>
+              <a:buFont typeface="Arial" panose="020B0604020202020204" pitchFamily="34" charset="0"/>
+              <a:buChar char="•"/>
+              <a:defRPr sz="1800" kern="1200">
+                <a:solidFill>
+                  <a:schemeClr val="tx1"/>
+                </a:solidFill>
+                <a:latin typeface="+mn-lt"/>
+                <a:ea typeface="+mn-ea"/>
+                <a:cs typeface="+mn-cs"/>
+              </a:defRPr>
+            </a:lvl6pPr>
+            <a:lvl7pPr marL="2971800" indent="-228600" algn="l" defTabSz="914400" rtl="0" eaLnBrk="1" latinLnBrk="0" hangingPunct="1">
+              <a:lnSpc>
+                <a:spcPct val="90000"/>
+              </a:lnSpc>
+              <a:spcBef>
+                <a:spcPts val="500"/>
+              </a:spcBef>
+              <a:buFont typeface="Arial" panose="020B0604020202020204" pitchFamily="34" charset="0"/>
+              <a:buChar char="•"/>
+              <a:defRPr sz="1800" kern="1200">
+                <a:solidFill>
+                  <a:schemeClr val="tx1"/>
+                </a:solidFill>
+                <a:latin typeface="+mn-lt"/>
+                <a:ea typeface="+mn-ea"/>
+                <a:cs typeface="+mn-cs"/>
+              </a:defRPr>
+            </a:lvl7pPr>
+            <a:lvl8pPr marL="3429000" indent="-228600" algn="l" defTabSz="914400" rtl="0" eaLnBrk="1" latinLnBrk="0" hangingPunct="1">
+              <a:lnSpc>
+                <a:spcPct val="90000"/>
+              </a:lnSpc>
+              <a:spcBef>
+                <a:spcPts val="500"/>
+              </a:spcBef>
+              <a:buFont typeface="Arial" panose="020B0604020202020204" pitchFamily="34" charset="0"/>
+              <a:buChar char="•"/>
+              <a:defRPr sz="1800" kern="1200">
+                <a:solidFill>
+                  <a:schemeClr val="tx1"/>
+                </a:solidFill>
+                <a:latin typeface="+mn-lt"/>
+                <a:ea typeface="+mn-ea"/>
+                <a:cs typeface="+mn-cs"/>
+              </a:defRPr>
+            </a:lvl8pPr>
+            <a:lvl9pPr marL="3886200" indent="-228600" algn="l" defTabSz="914400" rtl="0" eaLnBrk="1" latinLnBrk="0" hangingPunct="1">
+              <a:lnSpc>
+                <a:spcPct val="90000"/>
+              </a:lnSpc>
+              <a:spcBef>
+                <a:spcPts val="500"/>
+              </a:spcBef>
+              <a:buFont typeface="Arial" panose="020B0604020202020204" pitchFamily="34" charset="0"/>
+              <a:buChar char="•"/>
+              <a:defRPr sz="1800" kern="1200">
+                <a:solidFill>
+                  <a:schemeClr val="tx1"/>
+                </a:solidFill>
+                <a:latin typeface="+mn-lt"/>
+                <a:ea typeface="+mn-ea"/>
+                <a:cs typeface="+mn-cs"/>
+              </a:defRPr>
+            </a:lvl9pPr>
+          </a:lstStyle>
+          <a:p>
+            <a:r>
+              <a:rPr lang="zh-CN" altLang="en-US">
+                <a:cs typeface="+mn-lt"/>
+              </a:rPr>
+              <a:t>private static Connection getConn() {</a:t>
+            </a:r>
+            <a:endParaRPr lang="zh-CN" altLang="en-US">
+              <a:cs typeface="+mn-lt"/>
+            </a:endParaRPr>
+          </a:p>
+          <a:p>
+            <a:pPr lvl="1"/>
+            <a:r>
+              <a:rPr lang="zh-CN" altLang="en-US">
+                <a:cs typeface="+mn-lt"/>
+              </a:rPr>
+              <a:t> String driver = "com.mysql.jdbc.Driver";</a:t>
+            </a:r>
+            <a:endParaRPr lang="zh-CN" altLang="en-US">
+              <a:cs typeface="+mn-lt"/>
+            </a:endParaRPr>
+          </a:p>
+          <a:p>
+            <a:pPr lvl="1"/>
+            <a:r>
+              <a:rPr lang="zh-CN" altLang="en-US">
+                <a:cs typeface="+mn-lt"/>
+              </a:rPr>
+              <a:t>String url = "jdbc:mysql://localhost:3306/test";</a:t>
+            </a:r>
+            <a:endParaRPr lang="zh-CN" altLang="en-US">
+              <a:cs typeface="+mn-lt"/>
+            </a:endParaRPr>
+          </a:p>
+          <a:p>
+            <a:pPr lvl="1"/>
+            <a:r>
+              <a:rPr lang="zh-CN" altLang="en-US">
+                <a:cs typeface="+mn-lt"/>
+              </a:rPr>
+              <a:t>String username = "root";</a:t>
+            </a:r>
+            <a:endParaRPr lang="zh-CN" altLang="en-US">
+              <a:cs typeface="+mn-lt"/>
+            </a:endParaRPr>
+          </a:p>
+          <a:p>
+            <a:pPr lvl="1"/>
+            <a:r>
+              <a:rPr lang="zh-CN" altLang="en-US">
+                <a:cs typeface="+mn-lt"/>
+              </a:rPr>
+              <a:t>String password = "root";</a:t>
+            </a:r>
+            <a:endParaRPr lang="zh-CN" altLang="en-US">
+              <a:cs typeface="+mn-lt"/>
+            </a:endParaRPr>
+          </a:p>
+          <a:p>
+            <a:pPr lvl="1"/>
+            <a:r>
+              <a:rPr lang="zh-CN" altLang="en-US">
+                <a:cs typeface="+mn-lt"/>
+              </a:rPr>
+              <a:t>Connection conn = null;</a:t>
+            </a:r>
+            <a:endParaRPr lang="zh-CN" altLang="en-US">
+              <a:cs typeface="+mn-lt"/>
+            </a:endParaRPr>
+          </a:p>
+          <a:p>
+            <a:pPr lvl="1"/>
+            <a:r>
+              <a:rPr lang="zh-CN" altLang="en-US">
+                <a:cs typeface="+mn-lt"/>
+                <a:sym typeface="+mn-ea"/>
+              </a:rPr>
+              <a:t>Class.forName(driver); //classLoader,加载对应驱动</a:t>
+            </a:r>
+            <a:endParaRPr lang="zh-CN" altLang="en-US">
+              <a:cs typeface="+mn-lt"/>
+            </a:endParaRPr>
+          </a:p>
+          <a:p>
+            <a:pPr lvl="1"/>
+            <a:r>
+              <a:rPr lang="zh-CN" altLang="en-US">
+                <a:cs typeface="+mn-lt"/>
+                <a:sym typeface="+mn-ea"/>
+              </a:rPr>
+              <a:t>conn = (Connection) DriverManager.getConnection(url, username, password);</a:t>
+            </a:r>
+            <a:endParaRPr lang="zh-CN" altLang="en-US">
+              <a:cs typeface="+mn-lt"/>
+            </a:endParaRPr>
+          </a:p>
+          <a:p>
+            <a:pPr lvl="1"/>
+            <a:r>
+              <a:rPr lang="zh-CN" altLang="en-US">
+                <a:cs typeface="+mn-lt"/>
+              </a:rPr>
+              <a:t>return conn;</a:t>
+            </a:r>
+            <a:endParaRPr lang="zh-CN" altLang="en-US">
+              <a:cs typeface="+mn-lt"/>
+            </a:endParaRPr>
+          </a:p>
+          <a:p>
+            <a:r>
+              <a:rPr lang="zh-CN" altLang="en-US">
+                <a:cs typeface="+mn-lt"/>
+              </a:rPr>
+              <a:t>}</a:t>
+            </a:r>
+            <a:endParaRPr lang="zh-CN" altLang="en-US">
+              <a:cs typeface="+mn-lt"/>
+            </a:endParaRPr>
+          </a:p>
+        </p:txBody>
+      </p:sp>
+      <p:sp>
+        <p:nvSpPr>
+          <p:cNvPr id="5" name="内容占位符 2"/>
+          <p:cNvSpPr>
+            <a:spLocks noGrp="1"/>
+          </p:cNvSpPr>
+          <p:nvPr/>
+        </p:nvSpPr>
+        <p:spPr>
+          <a:xfrm>
+            <a:off x="6254750" y="365125"/>
+            <a:ext cx="5480050" cy="6008370"/>
+          </a:xfrm>
+          <a:prstGeom prst="rect">
+            <a:avLst/>
+          </a:prstGeom>
+        </p:spPr>
+        <p:txBody>
+          <a:bodyPr vert="horz" lIns="91440" tIns="45720" rIns="91440" bIns="45720" rtlCol="0">
+            <a:normAutofit/>
+          </a:bodyPr>
+          <a:lstStyle>
+            <a:lvl1pPr marL="228600" indent="-228600" algn="l" defTabSz="914400" rtl="0" eaLnBrk="1" latinLnBrk="0" hangingPunct="1">
+              <a:lnSpc>
+                <a:spcPct val="90000"/>
+              </a:lnSpc>
+              <a:spcBef>
+                <a:spcPts val="1000"/>
+              </a:spcBef>
+              <a:buFont typeface="Arial" panose="020B0604020202020204" pitchFamily="34" charset="0"/>
+              <a:buChar char="•"/>
+              <a:defRPr sz="2800" kern="1200">
+                <a:solidFill>
+                  <a:schemeClr val="tx1"/>
+                </a:solidFill>
+                <a:latin typeface="+mn-lt"/>
+                <a:ea typeface="+mn-ea"/>
+                <a:cs typeface="+mn-cs"/>
+              </a:defRPr>
+            </a:lvl1pPr>
+            <a:lvl2pPr marL="685800" indent="-228600" algn="l" defTabSz="914400" rtl="0" eaLnBrk="1" latinLnBrk="0" hangingPunct="1">
+              <a:lnSpc>
+                <a:spcPct val="90000"/>
+              </a:lnSpc>
+              <a:spcBef>
+                <a:spcPts val="500"/>
+              </a:spcBef>
+              <a:buFont typeface="Arial" panose="020B0604020202020204" pitchFamily="34" charset="0"/>
+              <a:buChar char="•"/>
+              <a:defRPr sz="2400" kern="1200">
+                <a:solidFill>
+                  <a:schemeClr val="tx1"/>
+                </a:solidFill>
+                <a:latin typeface="+mn-lt"/>
+                <a:ea typeface="+mn-ea"/>
+                <a:cs typeface="+mn-cs"/>
+              </a:defRPr>
+            </a:lvl2pPr>
+            <a:lvl3pPr marL="1143000" indent="-228600" algn="l" defTabSz="914400" rtl="0" eaLnBrk="1" latinLnBrk="0" hangingPunct="1">
+              <a:lnSpc>
+                <a:spcPct val="90000"/>
+              </a:lnSpc>
+              <a:spcBef>
+                <a:spcPts val="500"/>
+              </a:spcBef>
+              <a:buFont typeface="Arial" panose="020B0604020202020204" pitchFamily="34" charset="0"/>
+              <a:buChar char="•"/>
+              <a:defRPr sz="2000" kern="1200">
+                <a:solidFill>
+                  <a:schemeClr val="tx1"/>
+                </a:solidFill>
+                <a:latin typeface="+mn-lt"/>
+                <a:ea typeface="+mn-ea"/>
+                <a:cs typeface="+mn-cs"/>
+              </a:defRPr>
+            </a:lvl3pPr>
+            <a:lvl4pPr marL="1600200" indent="-228600" algn="l" defTabSz="914400" rtl="0" eaLnBrk="1" latinLnBrk="0" hangingPunct="1">
+              <a:lnSpc>
+                <a:spcPct val="90000"/>
+              </a:lnSpc>
+              <a:spcBef>
+                <a:spcPts val="500"/>
+              </a:spcBef>
+              <a:buFont typeface="Arial" panose="020B0604020202020204" pitchFamily="34" charset="0"/>
+              <a:buChar char="•"/>
+              <a:defRPr sz="1800" kern="1200">
+                <a:solidFill>
+                  <a:schemeClr val="tx1"/>
+                </a:solidFill>
+                <a:latin typeface="+mn-lt"/>
+                <a:ea typeface="+mn-ea"/>
+                <a:cs typeface="+mn-cs"/>
+              </a:defRPr>
+            </a:lvl4pPr>
+            <a:lvl5pPr marL="2057400" indent="-228600" algn="l" defTabSz="914400" rtl="0" eaLnBrk="1" latinLnBrk="0" hangingPunct="1">
+              <a:lnSpc>
+                <a:spcPct val="90000"/>
+              </a:lnSpc>
+              <a:spcBef>
+                <a:spcPts val="500"/>
+              </a:spcBef>
+              <a:buFont typeface="Arial" panose="020B0604020202020204" pitchFamily="34" charset="0"/>
+              <a:buChar char="•"/>
+              <a:defRPr sz="1800" kern="1200">
+                <a:solidFill>
+                  <a:schemeClr val="tx1"/>
+                </a:solidFill>
+                <a:latin typeface="+mn-lt"/>
+                <a:ea typeface="+mn-ea"/>
+                <a:cs typeface="+mn-cs"/>
+              </a:defRPr>
+            </a:lvl5pPr>
+            <a:lvl6pPr marL="2514600" indent="-228600" algn="l" defTabSz="914400" rtl="0" eaLnBrk="1" latinLnBrk="0" hangingPunct="1">
+              <a:lnSpc>
+                <a:spcPct val="90000"/>
+              </a:lnSpc>
+              <a:spcBef>
+                <a:spcPts val="500"/>
+              </a:spcBef>
+              <a:buFont typeface="Arial" panose="020B0604020202020204" pitchFamily="34" charset="0"/>
+              <a:buChar char="•"/>
+              <a:defRPr sz="1800" kern="1200">
+                <a:solidFill>
+                  <a:schemeClr val="tx1"/>
+                </a:solidFill>
+                <a:latin typeface="+mn-lt"/>
+                <a:ea typeface="+mn-ea"/>
+                <a:cs typeface="+mn-cs"/>
+              </a:defRPr>
+            </a:lvl6pPr>
+            <a:lvl7pPr marL="2971800" indent="-228600" algn="l" defTabSz="914400" rtl="0" eaLnBrk="1" latinLnBrk="0" hangingPunct="1">
+              <a:lnSpc>
+                <a:spcPct val="90000"/>
+              </a:lnSpc>
+              <a:spcBef>
+                <a:spcPts val="500"/>
+              </a:spcBef>
+              <a:buFont typeface="Arial" panose="020B0604020202020204" pitchFamily="34" charset="0"/>
+              <a:buChar char="•"/>
+              <a:defRPr sz="1800" kern="1200">
+                <a:solidFill>
+                  <a:schemeClr val="tx1"/>
+                </a:solidFill>
+                <a:latin typeface="+mn-lt"/>
+                <a:ea typeface="+mn-ea"/>
+                <a:cs typeface="+mn-cs"/>
+              </a:defRPr>
+            </a:lvl7pPr>
+            <a:lvl8pPr marL="3429000" indent="-228600" algn="l" defTabSz="914400" rtl="0" eaLnBrk="1" latinLnBrk="0" hangingPunct="1">
+              <a:lnSpc>
+                <a:spcPct val="90000"/>
+              </a:lnSpc>
+              <a:spcBef>
+                <a:spcPts val="500"/>
+              </a:spcBef>
+              <a:buFont typeface="Arial" panose="020B0604020202020204" pitchFamily="34" charset="0"/>
+              <a:buChar char="•"/>
+              <a:defRPr sz="1800" kern="1200">
+                <a:solidFill>
+                  <a:schemeClr val="tx1"/>
+                </a:solidFill>
+                <a:latin typeface="+mn-lt"/>
+                <a:ea typeface="+mn-ea"/>
+                <a:cs typeface="+mn-cs"/>
+              </a:defRPr>
+            </a:lvl8pPr>
+            <a:lvl9pPr marL="3886200" indent="-228600" algn="l" defTabSz="914400" rtl="0" eaLnBrk="1" latinLnBrk="0" hangingPunct="1">
+              <a:lnSpc>
+                <a:spcPct val="90000"/>
+              </a:lnSpc>
+              <a:spcBef>
+                <a:spcPts val="500"/>
+              </a:spcBef>
+              <a:buFont typeface="Arial" panose="020B0604020202020204" pitchFamily="34" charset="0"/>
+              <a:buChar char="•"/>
+              <a:defRPr sz="1800" kern="1200">
+                <a:solidFill>
+                  <a:schemeClr val="tx1"/>
+                </a:solidFill>
+                <a:latin typeface="+mn-lt"/>
+                <a:ea typeface="+mn-ea"/>
+                <a:cs typeface="+mn-cs"/>
+              </a:defRPr>
+            </a:lvl9pPr>
+          </a:lstStyle>
           <a:p>
             <a:r>
               <a:rPr lang="zh-CN" altLang="en-US"/>
-              <a:t>以</a:t>
-            </a:r>
-            <a:r>
-              <a:rPr lang="en-US" altLang="zh-CN"/>
-              <a:t>Student</a:t>
-            </a:r>
+              <a:t>private static newBook(Book book) {</a:t>
+            </a:r>
+            <a:endParaRPr lang="zh-CN" altLang="en-US"/>
+          </a:p>
+          <a:p>
+            <a:pPr lvl="1"/>
             <a:r>
               <a:rPr lang="zh-CN" altLang="en-US"/>
-              <a:t>对象为例</a:t>
-            </a:r>
-            <a:endParaRPr lang="zh-CN" altLang="en-US"/>
-          </a:p>
-          <a:p>
-            <a:r>
-              <a:rPr lang="en-US" altLang="zh-CN"/>
-              <a:t>Public Student implements Serializable{</a:t>
-            </a:r>
-            <a:endParaRPr lang="en-US" altLang="zh-CN"/>
-          </a:p>
-          <a:p>
-            <a:pPr lvl="1"/>
-            <a:r>
-              <a:rPr lang="en-US" altLang="zh-CN"/>
-              <a:t>fields</a:t>
-            </a:r>
-            <a:endParaRPr lang="en-US" altLang="zh-CN"/>
-          </a:p>
-          <a:p>
-            <a:pPr lvl="1"/>
-            <a:r>
-              <a:rPr lang="en-US" altLang="zh-CN"/>
-              <a:t>get/set</a:t>
-            </a:r>
-            <a:endParaRPr lang="en-US" altLang="zh-CN"/>
-          </a:p>
-          <a:p>
-            <a:pPr lvl="1"/>
-            <a:r>
-              <a:rPr lang="en-US" altLang="zh-CN"/>
-              <a:t>toString</a:t>
-            </a:r>
-            <a:endParaRPr lang="en-US" altLang="zh-CN"/>
-          </a:p>
-          <a:p>
-            <a:pPr lvl="1"/>
-            <a:r>
-              <a:rPr lang="en-US" altLang="zh-CN"/>
-              <a:t>......</a:t>
-            </a:r>
-            <a:endParaRPr lang="en-US" altLang="zh-CN"/>
-          </a:p>
-          <a:p>
-            <a:r>
-              <a:rPr lang="en-US" altLang="zh-CN"/>
+              <a:t> Connection conn = getConn();</a:t>
+            </a:r>
+            <a:endParaRPr lang="zh-CN" altLang="en-US"/>
+          </a:p>
+          <a:p>
+            <a:pPr lvl="1"/>
+            <a:r>
+              <a:rPr lang="zh-CN" altLang="en-US"/>
+              <a:t> String sql = "insert into book (id,name) values(?,?)";</a:t>
+            </a:r>
+            <a:endParaRPr lang="zh-CN" altLang="en-US"/>
+          </a:p>
+          <a:p>
+            <a:pPr lvl="1"/>
+            <a:r>
+              <a:rPr lang="zh-CN" altLang="en-US"/>
+              <a:t>PreparedStatement pstmt;</a:t>
+            </a:r>
+            <a:endParaRPr lang="zh-CN" altLang="en-US"/>
+          </a:p>
+          <a:p>
+            <a:pPr lvl="1"/>
+            <a:r>
+              <a:rPr lang="zh-CN" altLang="en-US"/>
+              <a:t>pstmt = (PreparedStatement) conn.prepareStatement(sql);</a:t>
+            </a:r>
+            <a:endParaRPr lang="zh-CN" altLang="en-US"/>
+          </a:p>
+          <a:p>
+            <a:pPr lvl="1"/>
+            <a:r>
+              <a:rPr lang="zh-CN" altLang="en-US"/>
+              <a:t> pstmt.setString(2, book.getName());</a:t>
+            </a:r>
+            <a:endParaRPr lang="zh-CN" altLang="en-US"/>
+          </a:p>
+          <a:p>
+            <a:pPr lvl="1"/>
+            <a:r>
+              <a:rPr lang="zh-CN" altLang="en-US"/>
+              <a:t>pstmt.setLong(1, book.getId());</a:t>
+            </a:r>
+            <a:endParaRPr lang="zh-CN" altLang="en-US"/>
+          </a:p>
+          <a:p>
+            <a:pPr lvl="1"/>
+            <a:r>
+              <a:rPr lang="zh-CN" altLang="en-US"/>
+              <a:t> i = pstmt.executeUpdate();</a:t>
+            </a:r>
+            <a:endParaRPr lang="zh-CN" altLang="en-US"/>
+          </a:p>
+          <a:p>
+            <a:pPr lvl="1"/>
+            <a:r>
+              <a:rPr lang="zh-CN" altLang="en-US"/>
+              <a:t>pstmt.close();</a:t>
+            </a:r>
+            <a:endParaRPr lang="zh-CN" altLang="en-US"/>
+          </a:p>
+          <a:p>
+            <a:pPr lvl="1"/>
+            <a:r>
+              <a:rPr lang="zh-CN" altLang="en-US"/>
+              <a:t>conn.close();</a:t>
+            </a:r>
+            <a:endParaRPr lang="zh-CN" altLang="en-US"/>
+          </a:p>
+          <a:p>
+            <a:r>
+              <a:rPr lang="zh-CN" altLang="en-US"/>
               <a:t>}</a:t>
             </a:r>
-            <a:endParaRPr lang="en-US" altLang="zh-CN"/>
+            <a:endParaRPr lang="zh-CN" altLang="en-US"/>
           </a:p>
         </p:txBody>
       </p:sp>
@@ -3771,191 +4592,73 @@
           <a:bodyPr/>
           <a:p>
             <a:r>
-              <a:rPr lang="zh-CN" altLang="en-US"/>
-              <a:t>利用实体对象、</a:t>
-            </a:r>
-            <a:r>
               <a:rPr lang="en-US" altLang="zh-CN"/>
               <a:t>DAO</a:t>
             </a:r>
+            <a:endParaRPr lang="en-US" altLang="zh-CN"/>
+          </a:p>
+        </p:txBody>
+      </p:sp>
+      <p:sp>
+        <p:nvSpPr>
+          <p:cNvPr id="3" name="内容占位符 2"/>
+          <p:cNvSpPr>
+            <a:spLocks noGrp="1"/>
+          </p:cNvSpPr>
+          <p:nvPr>
+            <p:ph idx="1"/>
+          </p:nvPr>
+        </p:nvSpPr>
+        <p:spPr/>
+        <p:txBody>
+          <a:bodyPr/>
+          <a:p>
             <a:r>
               <a:rPr lang="zh-CN" altLang="en-US"/>
-              <a:t>对象操作数据</a:t>
-            </a:r>
-            <a:endParaRPr lang="zh-CN" altLang="en-US"/>
-          </a:p>
-        </p:txBody>
-      </p:sp>
-      <p:sp>
-        <p:nvSpPr>
-          <p:cNvPr id="3" name="内容占位符 2"/>
-          <p:cNvSpPr>
-            <a:spLocks noGrp="1"/>
-          </p:cNvSpPr>
-          <p:nvPr>
-            <p:ph idx="1"/>
-          </p:nvPr>
-        </p:nvSpPr>
-        <p:spPr>
-          <a:xfrm>
-            <a:off x="838200" y="1825625"/>
-            <a:ext cx="4333875" cy="4351655"/>
-          </a:xfrm>
-        </p:spPr>
-        <p:txBody>
-          <a:bodyPr/>
+              <a:t>对数据的增删查改利用专门的对象进行操纵的方式</a:t>
+            </a:r>
+            <a:endParaRPr lang="zh-CN" altLang="en-US"/>
+          </a:p>
+          <a:p>
+            <a:endParaRPr lang="zh-CN" altLang="en-US"/>
+          </a:p>
           <a:p>
             <a:r>
               <a:rPr lang="zh-CN" altLang="en-US"/>
-              <a:t>以</a:t>
-            </a:r>
+              <a:t>加载驱动</a:t>
+            </a:r>
+            <a:endParaRPr lang="zh-CN" altLang="en-US"/>
+          </a:p>
+          <a:p>
             <a:r>
               <a:rPr lang="en-US" altLang="zh-CN"/>
-              <a:t>Student</a:t>
-            </a:r>
-            <a:r>
-              <a:rPr lang="zh-CN" altLang="en-US"/>
-              <a:t>对象为例</a:t>
-            </a:r>
-            <a:endParaRPr lang="zh-CN" altLang="en-US"/>
+              <a:t>classforname(“com.mysql.jdbc.connector”)</a:t>
+            </a:r>
+            <a:endParaRPr lang="en-US" altLang="zh-CN"/>
           </a:p>
           <a:p>
             <a:r>
               <a:rPr lang="en-US" altLang="zh-CN"/>
-              <a:t>Public class StudentDAO{</a:t>
+              <a:t>dr</a:t>
             </a:r>
             <a:endParaRPr lang="en-US" altLang="zh-CN"/>
           </a:p>
           <a:p>
-            <a:pPr lvl="1"/>
             <a:r>
               <a:rPr lang="en-US" altLang="zh-CN"/>
-              <a:t>Student findBy(???)</a:t>
+              <a:t>name</a:t>
             </a:r>
             <a:endParaRPr lang="en-US" altLang="zh-CN"/>
           </a:p>
           <a:p>
-            <a:pPr lvl="1"/>
             <a:r>
               <a:rPr lang="en-US" altLang="zh-CN"/>
-              <a:t>List </a:t>
-            </a:r>
-            <a:r>
-              <a:rPr lang="en-US" altLang="zh-CN">
-                <a:sym typeface="+mn-ea"/>
-              </a:rPr>
-              <a:t>Student findBy(???)</a:t>
-            </a:r>
-            <a:endParaRPr lang="en-US" altLang="zh-CN">
-              <a:sym typeface="+mn-ea"/>
-            </a:endParaRPr>
-          </a:p>
-          <a:p>
-            <a:pPr lvl="1"/>
-            <a:r>
-              <a:rPr lang="en-US" altLang="zh-CN">
-                <a:sym typeface="+mn-ea"/>
-              </a:rPr>
-              <a:t>add </a:t>
-            </a:r>
-            <a:r>
-              <a:rPr lang="zh-CN" altLang="en-US">
-                <a:sym typeface="+mn-ea"/>
-              </a:rPr>
-              <a:t>（</a:t>
-            </a:r>
-            <a:r>
-              <a:rPr lang="en-US" altLang="zh-CN">
-                <a:sym typeface="+mn-ea"/>
-              </a:rPr>
-              <a:t>???</a:t>
-            </a:r>
-            <a:r>
-              <a:rPr lang="zh-CN" altLang="en-US">
-                <a:sym typeface="+mn-ea"/>
-              </a:rPr>
-              <a:t>）</a:t>
-            </a:r>
-            <a:endParaRPr lang="zh-CN" altLang="en-US">
-              <a:sym typeface="+mn-ea"/>
-            </a:endParaRPr>
-          </a:p>
-          <a:p>
-            <a:pPr lvl="1"/>
-            <a:r>
-              <a:rPr lang="en-US" altLang="zh-CN">
-                <a:sym typeface="+mn-ea"/>
-              </a:rPr>
-              <a:t>modify(???)</a:t>
-            </a:r>
-            <a:endParaRPr lang="en-US" altLang="zh-CN">
-              <a:sym typeface="+mn-ea"/>
-            </a:endParaRPr>
-          </a:p>
-          <a:p>
-            <a:pPr lvl="1"/>
-            <a:r>
-              <a:rPr lang="en-US" altLang="zh-CN">
-                <a:sym typeface="+mn-ea"/>
-              </a:rPr>
-              <a:t>delete(???)</a:t>
-            </a:r>
-            <a:endParaRPr lang="en-US" altLang="zh-CN">
-              <a:sym typeface="+mn-ea"/>
-            </a:endParaRPr>
-          </a:p>
-          <a:p>
-            <a:pPr lvl="1"/>
-            <a:endParaRPr lang="en-US" altLang="zh-CN">
-              <a:sym typeface="+mn-ea"/>
-            </a:endParaRPr>
-          </a:p>
-          <a:p>
-            <a:pPr lvl="1"/>
+              <a:t>...</a:t>
+            </a:r>
             <a:endParaRPr lang="en-US" altLang="zh-CN"/>
           </a:p>
           <a:p>
-            <a:r>
-              <a:rPr lang="en-US" altLang="zh-CN"/>
-              <a:t>}</a:t>
-            </a:r>
-            <a:endParaRPr lang="en-US" altLang="zh-CN"/>
-          </a:p>
-        </p:txBody>
-      </p:sp>
-      <p:sp>
-        <p:nvSpPr>
-          <p:cNvPr id="4" name="文本框 3"/>
-          <p:cNvSpPr txBox="1"/>
-          <p:nvPr/>
-        </p:nvSpPr>
-        <p:spPr>
-          <a:xfrm>
-            <a:off x="6841490" y="1941830"/>
-            <a:ext cx="3622675" cy="1014730"/>
-          </a:xfrm>
-          <a:prstGeom prst="rect">
-            <a:avLst/>
-          </a:prstGeom>
-          <a:noFill/>
-        </p:spPr>
-        <p:txBody>
-          <a:bodyPr wrap="square" rtlCol="0">
-            <a:spAutoFit/>
-          </a:bodyPr>
-          <a:p>
-            <a:r>
-              <a:rPr lang="zh-CN" altLang="en-US" sz="2000"/>
-              <a:t>抽取公共的操纵数据库的方法</a:t>
-            </a:r>
-            <a:endParaRPr lang="zh-CN" altLang="en-US" sz="2000"/>
-          </a:p>
-          <a:p>
-            <a:r>
-              <a:rPr lang="zh-CN" altLang="en-US" sz="2000"/>
-              <a:t>抽取对象封装位查询语句的方法</a:t>
-            </a:r>
-            <a:endParaRPr lang="zh-CN" altLang="en-US" sz="2000"/>
+            <a:endParaRPr lang="zh-CN" altLang="en-US"/>
           </a:p>
         </p:txBody>
       </p:sp>
@@ -3992,12 +4695,16 @@
           <a:bodyPr/>
           <a:p>
             <a:r>
+              <a:rPr lang="zh-CN" altLang="en-US"/>
+              <a:t>利用实体对象、</a:t>
+            </a:r>
+            <a:r>
               <a:rPr lang="en-US" altLang="zh-CN"/>
-              <a:t>Hibernate</a:t>
+              <a:t>DAO</a:t>
             </a:r>
             <a:r>
               <a:rPr lang="zh-CN" altLang="en-US"/>
-              <a:t>框架</a:t>
+              <a:t>对象操作数据</a:t>
             </a:r>
             <a:endParaRPr lang="zh-CN" altLang="en-US"/>
           </a:p>
@@ -4013,46 +4720,218 @@
             <p:ph idx="1"/>
           </p:nvPr>
         </p:nvSpPr>
+        <p:spPr>
+          <a:xfrm>
+            <a:off x="838200" y="1825625"/>
+            <a:ext cx="6186805" cy="4351655"/>
+          </a:xfrm>
+        </p:spPr>
+        <p:txBody>
+          <a:bodyPr/>
+          <a:p>
+            <a:r>
+              <a:rPr lang="zh-CN" altLang="en-US"/>
+              <a:t>以</a:t>
+            </a:r>
+            <a:r>
+              <a:rPr lang="en-US" altLang="zh-CN"/>
+              <a:t>Student</a:t>
+            </a:r>
+            <a:r>
+              <a:rPr lang="zh-CN" altLang="en-US"/>
+              <a:t>对象为例</a:t>
+            </a:r>
+            <a:endParaRPr lang="zh-CN" altLang="en-US"/>
+          </a:p>
+          <a:p>
+            <a:r>
+              <a:rPr lang="en-US" altLang="zh-CN"/>
+              <a:t>Public Student implements Serializable{</a:t>
+            </a:r>
+            <a:endParaRPr lang="en-US" altLang="zh-CN"/>
+          </a:p>
+          <a:p>
+            <a:pPr lvl="1"/>
+            <a:r>
+              <a:rPr lang="en-US" altLang="zh-CN"/>
+              <a:t>fields</a:t>
+            </a:r>
+            <a:endParaRPr lang="en-US" altLang="zh-CN"/>
+          </a:p>
+          <a:p>
+            <a:pPr lvl="1"/>
+            <a:r>
+              <a:rPr lang="en-US" altLang="zh-CN"/>
+              <a:t>get/set</a:t>
+            </a:r>
+            <a:endParaRPr lang="en-US" altLang="zh-CN"/>
+          </a:p>
+          <a:p>
+            <a:pPr lvl="1"/>
+            <a:r>
+              <a:rPr lang="en-US" altLang="zh-CN"/>
+              <a:t>toString</a:t>
+            </a:r>
+            <a:endParaRPr lang="en-US" altLang="zh-CN"/>
+          </a:p>
+          <a:p>
+            <a:pPr lvl="1"/>
+            <a:r>
+              <a:rPr lang="en-US" altLang="zh-CN"/>
+              <a:t>......</a:t>
+            </a:r>
+            <a:endParaRPr lang="en-US" altLang="zh-CN"/>
+          </a:p>
+          <a:p>
+            <a:r>
+              <a:rPr lang="en-US" altLang="zh-CN"/>
+              <a:t>}</a:t>
+            </a:r>
+            <a:endParaRPr lang="en-US" altLang="zh-CN"/>
+          </a:p>
+        </p:txBody>
+      </p:sp>
+    </p:spTree>
+  </p:cSld>
+  <p:clrMapOvr>
+    <a:masterClrMapping/>
+  </p:clrMapOvr>
+</p:sld>
+</file>
+
+<file path=ppt/slides/slide9.xml><?xml version="1.0" encoding="utf-8"?>
+<p:sld xmlns:a="http://schemas.openxmlformats.org/drawingml/2006/main" xmlns:r="http://schemas.openxmlformats.org/officeDocument/2006/relationships" xmlns:p="http://schemas.openxmlformats.org/presentationml/2006/main">
+  <p:cSld>
+    <p:spTree>
+      <p:nvGrpSpPr>
+        <p:cNvPr id="1" name=""/>
+        <p:cNvGrpSpPr/>
+        <p:nvPr/>
+      </p:nvGrpSpPr>
+      <p:grpSpPr/>
+      <p:sp>
+        <p:nvSpPr>
+          <p:cNvPr id="2" name="标题 1"/>
+          <p:cNvSpPr>
+            <a:spLocks noGrp="1"/>
+          </p:cNvSpPr>
+          <p:nvPr>
+            <p:ph type="title"/>
+          </p:nvPr>
+        </p:nvSpPr>
         <p:spPr/>
         <p:txBody>
           <a:bodyPr/>
           <a:p>
             <a:r>
-              <a:rPr lang="zh-CN" altLang="en-US"/>
-              <a:t>结合</a:t>
-            </a:r>
-            <a:r>
-              <a:rPr lang="en-US" altLang="zh-CN"/>
-              <a:t>MyEclipse4Spring</a:t>
-            </a:r>
-            <a:r>
-              <a:rPr lang="zh-CN" altLang="en-US"/>
-              <a:t>讲解</a:t>
-            </a:r>
-            <a:endParaRPr lang="zh-CN" altLang="en-US"/>
-          </a:p>
-          <a:p>
-            <a:r>
-              <a:rPr lang="zh-CN" altLang="en-US"/>
-              <a:t>框架：</a:t>
-            </a:r>
-            <a:endParaRPr lang="zh-CN" altLang="en-US"/>
-          </a:p>
-          <a:p>
-            <a:pPr lvl="1"/>
-            <a:r>
-              <a:rPr lang="zh-CN" altLang="en-US"/>
-              <a:t>复用</a:t>
-            </a:r>
-            <a:endParaRPr lang="zh-CN" altLang="en-US"/>
-          </a:p>
-          <a:p>
-            <a:pPr lvl="1"/>
-            <a:r>
-              <a:rPr lang="zh-CN" altLang="en-US"/>
-              <a:t>设计很好，并有代码实现</a:t>
-            </a:r>
-            <a:endParaRPr lang="zh-CN" altLang="en-US"/>
+              <a:rPr lang="en-US" altLang="zh-CN">
+                <a:sym typeface="+mn-ea"/>
+              </a:rPr>
+              <a:t>H</a:t>
+            </a:r>
+            <a:r>
+              <a:rPr lang="en-US" altLang="zh-CN">
+                <a:sym typeface="+mn-ea"/>
+              </a:rPr>
+              <a:t>ibernate</a:t>
+            </a:r>
+            <a:r>
+              <a:rPr lang="zh-CN" altLang="en-US">
+                <a:sym typeface="+mn-ea"/>
+              </a:rPr>
+              <a:t>的发展进程 </a:t>
+            </a:r>
+            <a:endParaRPr lang="en-US" altLang="zh-CN"/>
+          </a:p>
+        </p:txBody>
+      </p:sp>
+      <p:sp>
+        <p:nvSpPr>
+          <p:cNvPr id="3" name="内容占位符 2"/>
+          <p:cNvSpPr>
+            <a:spLocks noGrp="1"/>
+          </p:cNvSpPr>
+          <p:nvPr>
+            <p:ph idx="1"/>
+          </p:nvPr>
+        </p:nvSpPr>
+        <p:spPr/>
+        <p:txBody>
+          <a:bodyPr/>
+          <a:p>
+            <a:endParaRPr lang="zh-CN" altLang="en-US" sz="3600"/>
+          </a:p>
+          <a:p>
+            <a:pPr lvl="1"/>
+            <a:r>
+              <a:rPr lang="zh-CN" altLang="en-US" sz="3200"/>
+              <a:t>不使用对象的数据</a:t>
+            </a:r>
+            <a:r>
+              <a:rPr lang="en-US" altLang="zh-CN" sz="3200"/>
+              <a:t>CRUD</a:t>
+            </a:r>
+            <a:endParaRPr lang="en-US" altLang="zh-CN" sz="3200"/>
+          </a:p>
+          <a:p>
+            <a:pPr lvl="1"/>
+            <a:r>
+              <a:rPr lang="zh-CN" altLang="en-US" sz="3200"/>
+              <a:t>使用对象表示数据的数据</a:t>
+            </a:r>
+            <a:r>
+              <a:rPr lang="en-US" altLang="zh-CN" sz="3200"/>
+              <a:t>CRUD</a:t>
+            </a:r>
+            <a:endParaRPr lang="en-US" altLang="zh-CN" sz="3200"/>
+          </a:p>
+          <a:p>
+            <a:pPr lvl="1"/>
+            <a:r>
+              <a:rPr lang="zh-CN" altLang="en-US" sz="3200"/>
+              <a:t>使用映射的对象和</a:t>
+            </a:r>
+            <a:r>
+              <a:rPr lang="en-US" altLang="zh-CN" sz="3200"/>
+              <a:t>DAO</a:t>
+            </a:r>
+            <a:r>
+              <a:rPr lang="zh-CN" altLang="en-US" sz="3200"/>
+              <a:t>分层设计的数据</a:t>
+            </a:r>
+            <a:r>
+              <a:rPr lang="en-US" altLang="zh-CN" sz="3200"/>
+              <a:t>CRUD</a:t>
+            </a:r>
+            <a:endParaRPr lang="en-US" altLang="zh-CN" sz="3200"/>
+          </a:p>
+          <a:p>
+            <a:pPr lvl="1"/>
+            <a:r>
+              <a:rPr lang="zh-CN" altLang="en-US" sz="3200"/>
+              <a:t>将</a:t>
+            </a:r>
+            <a:r>
+              <a:rPr lang="en-US" altLang="zh-CN" sz="3200"/>
+              <a:t>JDBC</a:t>
+            </a:r>
+            <a:r>
+              <a:rPr lang="zh-CN" altLang="en-US" sz="3200"/>
+              <a:t>的操作抽取出来的</a:t>
+            </a:r>
+            <a:r>
+              <a:rPr lang="en-US" altLang="zh-CN" sz="3200"/>
+              <a:t>DAO</a:t>
+            </a:r>
+            <a:r>
+              <a:rPr lang="zh-CN" altLang="en-US" sz="3200"/>
+              <a:t>层的更高层的数据</a:t>
+            </a:r>
+            <a:r>
+              <a:rPr lang="en-US" altLang="zh-CN" sz="3200"/>
+              <a:t>CRUD</a:t>
+            </a:r>
+            <a:endParaRPr lang="en-US" altLang="zh-CN" sz="3200"/>
           </a:p>
         </p:txBody>
       </p:sp>

</xml_diff>